<commit_message>
Changes to some slides
</commit_message>
<xml_diff>
--- a/Presentation/Figs/Optimisation_TestingG.pptx
+++ b/Presentation/Figs/Optimisation_TestingG.pptx
@@ -261,7 +261,7 @@
           <a:p>
             <a:fld id="{F01BD231-D2B8-48E6-AF5A-0A46363B5204}" type="datetimeFigureOut">
               <a:rPr lang="en-AU" smtClean="0"/>
-              <a:t>16/05/2019</a:t>
+              <a:t>20/05/2019</a:t>
             </a:fld>
             <a:endParaRPr lang="en-AU"/>
           </a:p>
@@ -461,7 +461,7 @@
           <a:p>
             <a:fld id="{F01BD231-D2B8-48E6-AF5A-0A46363B5204}" type="datetimeFigureOut">
               <a:rPr lang="en-AU" smtClean="0"/>
-              <a:t>16/05/2019</a:t>
+              <a:t>20/05/2019</a:t>
             </a:fld>
             <a:endParaRPr lang="en-AU"/>
           </a:p>
@@ -671,7 +671,7 @@
           <a:p>
             <a:fld id="{F01BD231-D2B8-48E6-AF5A-0A46363B5204}" type="datetimeFigureOut">
               <a:rPr lang="en-AU" smtClean="0"/>
-              <a:t>16/05/2019</a:t>
+              <a:t>20/05/2019</a:t>
             </a:fld>
             <a:endParaRPr lang="en-AU"/>
           </a:p>
@@ -871,7 +871,7 @@
           <a:p>
             <a:fld id="{F01BD231-D2B8-48E6-AF5A-0A46363B5204}" type="datetimeFigureOut">
               <a:rPr lang="en-AU" smtClean="0"/>
-              <a:t>16/05/2019</a:t>
+              <a:t>20/05/2019</a:t>
             </a:fld>
             <a:endParaRPr lang="en-AU"/>
           </a:p>
@@ -1147,7 +1147,7 @@
           <a:p>
             <a:fld id="{F01BD231-D2B8-48E6-AF5A-0A46363B5204}" type="datetimeFigureOut">
               <a:rPr lang="en-AU" smtClean="0"/>
-              <a:t>16/05/2019</a:t>
+              <a:t>20/05/2019</a:t>
             </a:fld>
             <a:endParaRPr lang="en-AU"/>
           </a:p>
@@ -1415,7 +1415,7 @@
           <a:p>
             <a:fld id="{F01BD231-D2B8-48E6-AF5A-0A46363B5204}" type="datetimeFigureOut">
               <a:rPr lang="en-AU" smtClean="0"/>
-              <a:t>16/05/2019</a:t>
+              <a:t>20/05/2019</a:t>
             </a:fld>
             <a:endParaRPr lang="en-AU"/>
           </a:p>
@@ -1830,7 +1830,7 @@
           <a:p>
             <a:fld id="{F01BD231-D2B8-48E6-AF5A-0A46363B5204}" type="datetimeFigureOut">
               <a:rPr lang="en-AU" smtClean="0"/>
-              <a:t>16/05/2019</a:t>
+              <a:t>20/05/2019</a:t>
             </a:fld>
             <a:endParaRPr lang="en-AU"/>
           </a:p>
@@ -1972,7 +1972,7 @@
           <a:p>
             <a:fld id="{F01BD231-D2B8-48E6-AF5A-0A46363B5204}" type="datetimeFigureOut">
               <a:rPr lang="en-AU" smtClean="0"/>
-              <a:t>16/05/2019</a:t>
+              <a:t>20/05/2019</a:t>
             </a:fld>
             <a:endParaRPr lang="en-AU"/>
           </a:p>
@@ -2085,7 +2085,7 @@
           <a:p>
             <a:fld id="{F01BD231-D2B8-48E6-AF5A-0A46363B5204}" type="datetimeFigureOut">
               <a:rPr lang="en-AU" smtClean="0"/>
-              <a:t>16/05/2019</a:t>
+              <a:t>20/05/2019</a:t>
             </a:fld>
             <a:endParaRPr lang="en-AU"/>
           </a:p>
@@ -2398,7 +2398,7 @@
           <a:p>
             <a:fld id="{F01BD231-D2B8-48E6-AF5A-0A46363B5204}" type="datetimeFigureOut">
               <a:rPr lang="en-AU" smtClean="0"/>
-              <a:t>16/05/2019</a:t>
+              <a:t>20/05/2019</a:t>
             </a:fld>
             <a:endParaRPr lang="en-AU"/>
           </a:p>
@@ -2687,7 +2687,7 @@
           <a:p>
             <a:fld id="{F01BD231-D2B8-48E6-AF5A-0A46363B5204}" type="datetimeFigureOut">
               <a:rPr lang="en-AU" smtClean="0"/>
-              <a:t>16/05/2019</a:t>
+              <a:t>20/05/2019</a:t>
             </a:fld>
             <a:endParaRPr lang="en-AU"/>
           </a:p>
@@ -2930,7 +2930,7 @@
           <a:p>
             <a:fld id="{F01BD231-D2B8-48E6-AF5A-0A46363B5204}" type="datetimeFigureOut">
               <a:rPr lang="en-AU" smtClean="0"/>
-              <a:t>16/05/2019</a:t>
+              <a:t>20/05/2019</a:t>
             </a:fld>
             <a:endParaRPr lang="en-AU"/>
           </a:p>
@@ -4126,7 +4126,7 @@
                       <a:schemeClr val="tx1"/>
                     </a:solidFill>
                   </a:rPr>
-                  <a:t>1000 of 3-step ahead future paths</a:t>
+                  <a:t>1000 3-steps ahead future paths</a:t>
                 </a:r>
               </a:p>
             </p:txBody>
@@ -4832,7 +4832,7 @@
                       <a:schemeClr val="tx1"/>
                     </a:solidFill>
                   </a:rPr>
-                  <a:t>1000 of 3-step ahead future paths</a:t>
+                  <a:t>1000 3-steps ahead future paths</a:t>
                 </a:r>
               </a:p>
             </p:txBody>
@@ -5392,7 +5392,7 @@
                       <a:schemeClr val="tx1"/>
                     </a:solidFill>
                   </a:rPr>
-                  <a:t>1000 of 3-step ahead future paths</a:t>
+                  <a:t>1000 3-steps ahead future paths</a:t>
                 </a:r>
               </a:p>
             </p:txBody>
@@ -6013,7 +6013,7 @@
                       <a:schemeClr val="tx1"/>
                     </a:solidFill>
                   </a:rPr>
-                  <a:t>1000 of 3-step ahead future paths</a:t>
+                  <a:t>1000 3-steps ahead future paths</a:t>
                 </a:r>
               </a:p>
             </p:txBody>

</xml_diff>